<commit_message>
Revert "Revert "Transation_Table Scanner""
This reverts commit b22fb912efb27cb8a71c46ce87b81c4a8e53eb25.
</commit_message>
<xml_diff>
--- a/Graphs/DFA/DFA Drawing/full DFA.pptx
+++ b/Graphs/DFA/DFA Drawing/full DFA.pptx
@@ -243,7 +243,7 @@
           <a:p>
             <a:fld id="{3F93DD2E-470F-489C-B0E3-BD195B6FD9FF}" type="datetimeFigureOut">
               <a:rPr lang="en-US" smtClean="0"/>
-              <a:t>5/18/2022</a:t>
+              <a:t>5/20/2022</a:t>
             </a:fld>
             <a:endParaRPr lang="en-US"/>
           </a:p>
@@ -413,7 +413,7 @@
           <a:p>
             <a:fld id="{3F93DD2E-470F-489C-B0E3-BD195B6FD9FF}" type="datetimeFigureOut">
               <a:rPr lang="en-US" smtClean="0"/>
-              <a:t>5/18/2022</a:t>
+              <a:t>5/20/2022</a:t>
             </a:fld>
             <a:endParaRPr lang="en-US"/>
           </a:p>
@@ -593,7 +593,7 @@
           <a:p>
             <a:fld id="{3F93DD2E-470F-489C-B0E3-BD195B6FD9FF}" type="datetimeFigureOut">
               <a:rPr lang="en-US" smtClean="0"/>
-              <a:t>5/18/2022</a:t>
+              <a:t>5/20/2022</a:t>
             </a:fld>
             <a:endParaRPr lang="en-US"/>
           </a:p>
@@ -763,7 +763,7 @@
           <a:p>
             <a:fld id="{3F93DD2E-470F-489C-B0E3-BD195B6FD9FF}" type="datetimeFigureOut">
               <a:rPr lang="en-US" smtClean="0"/>
-              <a:t>5/18/2022</a:t>
+              <a:t>5/20/2022</a:t>
             </a:fld>
             <a:endParaRPr lang="en-US"/>
           </a:p>
@@ -1007,7 +1007,7 @@
           <a:p>
             <a:fld id="{3F93DD2E-470F-489C-B0E3-BD195B6FD9FF}" type="datetimeFigureOut">
               <a:rPr lang="en-US" smtClean="0"/>
-              <a:t>5/18/2022</a:t>
+              <a:t>5/20/2022</a:t>
             </a:fld>
             <a:endParaRPr lang="en-US"/>
           </a:p>
@@ -1239,7 +1239,7 @@
           <a:p>
             <a:fld id="{3F93DD2E-470F-489C-B0E3-BD195B6FD9FF}" type="datetimeFigureOut">
               <a:rPr lang="en-US" smtClean="0"/>
-              <a:t>5/18/2022</a:t>
+              <a:t>5/20/2022</a:t>
             </a:fld>
             <a:endParaRPr lang="en-US"/>
           </a:p>
@@ -1606,7 +1606,7 @@
           <a:p>
             <a:fld id="{3F93DD2E-470F-489C-B0E3-BD195B6FD9FF}" type="datetimeFigureOut">
               <a:rPr lang="en-US" smtClean="0"/>
-              <a:t>5/18/2022</a:t>
+              <a:t>5/20/2022</a:t>
             </a:fld>
             <a:endParaRPr lang="en-US"/>
           </a:p>
@@ -1724,7 +1724,7 @@
           <a:p>
             <a:fld id="{3F93DD2E-470F-489C-B0E3-BD195B6FD9FF}" type="datetimeFigureOut">
               <a:rPr lang="en-US" smtClean="0"/>
-              <a:t>5/18/2022</a:t>
+              <a:t>5/20/2022</a:t>
             </a:fld>
             <a:endParaRPr lang="en-US"/>
           </a:p>
@@ -1819,7 +1819,7 @@
           <a:p>
             <a:fld id="{3F93DD2E-470F-489C-B0E3-BD195B6FD9FF}" type="datetimeFigureOut">
               <a:rPr lang="en-US" smtClean="0"/>
-              <a:t>5/18/2022</a:t>
+              <a:t>5/20/2022</a:t>
             </a:fld>
             <a:endParaRPr lang="en-US"/>
           </a:p>
@@ -2096,7 +2096,7 @@
           <a:p>
             <a:fld id="{3F93DD2E-470F-489C-B0E3-BD195B6FD9FF}" type="datetimeFigureOut">
               <a:rPr lang="en-US" smtClean="0"/>
-              <a:t>5/18/2022</a:t>
+              <a:t>5/20/2022</a:t>
             </a:fld>
             <a:endParaRPr lang="en-US"/>
           </a:p>
@@ -2264,10 +2264,9 @@
           </a:lstStyle>
           <a:p>
             <a:r>
-              <a:rPr lang="en-US"/>
+              <a:rPr lang="en-US" dirty="0"/>
               <a:t>Click icon to add picture</a:t>
             </a:r>
-            <a:endParaRPr lang="en-US" dirty="0"/>
           </a:p>
         </p:txBody>
       </p:sp>
@@ -2353,7 +2352,7 @@
           <a:p>
             <a:fld id="{3F93DD2E-470F-489C-B0E3-BD195B6FD9FF}" type="datetimeFigureOut">
               <a:rPr lang="en-US" smtClean="0"/>
-              <a:t>5/18/2022</a:t>
+              <a:t>5/20/2022</a:t>
             </a:fld>
             <a:endParaRPr lang="en-US"/>
           </a:p>
@@ -2566,7 +2565,7 @@
           <a:p>
             <a:fld id="{3F93DD2E-470F-489C-B0E3-BD195B6FD9FF}" type="datetimeFigureOut">
               <a:rPr lang="en-US" smtClean="0"/>
-              <a:t>5/18/2022</a:t>
+              <a:t>5/20/2022</a:t>
             </a:fld>
             <a:endParaRPr lang="en-US"/>
           </a:p>
@@ -4097,7 +4096,7 @@
                   <a:schemeClr val="tx1"/>
                 </a:solidFill>
               </a:rPr>
-              <a:t>A</a:t>
+              <a:t>B</a:t>
             </a:r>
           </a:p>
         </p:txBody>
@@ -4228,7 +4227,7 @@
                   <a:schemeClr val="tx1"/>
                 </a:solidFill>
               </a:rPr>
-              <a:t>AH</a:t>
+              <a:t>AI</a:t>
             </a:r>
           </a:p>
         </p:txBody>
@@ -4343,7 +4342,7 @@
                     <a:schemeClr val="tx1"/>
                   </a:solidFill>
                 </a:rPr>
-                <a:t>B</a:t>
+                <a:t>C</a:t>
               </a:r>
             </a:p>
           </p:txBody>
@@ -4474,7 +4473,7 @@
                     <a:schemeClr val="tx1"/>
                   </a:solidFill>
                 </a:rPr>
-                <a:t>AI</a:t>
+                <a:t>AJ</a:t>
               </a:r>
             </a:p>
           </p:txBody>
@@ -4625,7 +4624,7 @@
                     <a:schemeClr val="tx1"/>
                   </a:solidFill>
                 </a:rPr>
-                <a:t>C</a:t>
+                <a:t>D</a:t>
               </a:r>
             </a:p>
           </p:txBody>
@@ -4756,7 +4755,7 @@
                     <a:schemeClr val="tx1"/>
                   </a:solidFill>
                 </a:rPr>
-                <a:t>AJ</a:t>
+                <a:t>AK</a:t>
               </a:r>
             </a:p>
           </p:txBody>
@@ -4858,60 +4857,6 @@
             </a:fontRef>
           </p:style>
         </p:cxnSp>
-        <p:sp>
-          <p:nvSpPr>
-            <p:cNvPr id="64" name="Oval 63">
-              <a:extLst>
-                <a:ext uri="{FF2B5EF4-FFF2-40B4-BE49-F238E27FC236}">
-                  <a16:creationId xmlns:a16="http://schemas.microsoft.com/office/drawing/2014/main" id="{FDBCC89B-65B6-472E-9133-7F3B330BE4F6}"/>
-                </a:ext>
-              </a:extLst>
-            </p:cNvPr>
-            <p:cNvSpPr/>
-            <p:nvPr/>
-          </p:nvSpPr>
-          <p:spPr>
-            <a:xfrm>
-              <a:off x="3113618" y="6553560"/>
-              <a:ext cx="365760" cy="365760"/>
-            </a:xfrm>
-            <a:prstGeom prst="ellipse">
-              <a:avLst/>
-            </a:prstGeom>
-            <a:noFill/>
-          </p:spPr>
-          <p:style>
-            <a:lnRef idx="2">
-              <a:schemeClr val="dk1">
-                <a:shade val="50000"/>
-              </a:schemeClr>
-            </a:lnRef>
-            <a:fillRef idx="1">
-              <a:schemeClr val="dk1"/>
-            </a:fillRef>
-            <a:effectRef idx="0">
-              <a:schemeClr val="dk1"/>
-            </a:effectRef>
-            <a:fontRef idx="minor">
-              <a:schemeClr val="lt1"/>
-            </a:fontRef>
-          </p:style>
-          <p:txBody>
-            <a:bodyPr lIns="0" tIns="0" rIns="0" bIns="0" rtlCol="0" anchor="ctr"/>
-            <a:lstStyle/>
-            <a:p>
-              <a:pPr algn="ctr"/>
-              <a:r>
-                <a:rPr lang="en-US" sz="1600" dirty="0">
-                  <a:solidFill>
-                    <a:schemeClr val="tx1"/>
-                  </a:solidFill>
-                </a:rPr>
-                <a:t>D</a:t>
-              </a:r>
-            </a:p>
-          </p:txBody>
-        </p:sp>
         <p:cxnSp>
           <p:nvCxnSpPr>
             <p:cNvPr id="65" name="Straight Arrow Connector 64">
@@ -5038,7 +4983,7 @@
                     <a:schemeClr val="tx1"/>
                   </a:solidFill>
                 </a:rPr>
-                <a:t>AK</a:t>
+                <a:t>AL</a:t>
               </a:r>
             </a:p>
           </p:txBody>
@@ -5171,7 +5116,7 @@
             <a:p>
               <a:r>
                 <a:rPr lang="en-US" sz="900" b="1" dirty="0"/>
-                <a:t>-</a:t>
+                <a:t>.</a:t>
               </a:r>
             </a:p>
           </p:txBody>
@@ -5226,7 +5171,7 @@
                     <a:schemeClr val="tx1"/>
                   </a:solidFill>
                 </a:rPr>
-                <a:t>E</a:t>
+                <a:t>F</a:t>
               </a:r>
             </a:p>
           </p:txBody>
@@ -5378,7 +5323,7 @@
                     <a:schemeClr val="tx1"/>
                   </a:solidFill>
                 </a:rPr>
-                <a:t>F</a:t>
+                <a:t>G</a:t>
               </a:r>
             </a:p>
           </p:txBody>
@@ -5475,7 +5420,7 @@
                   <a:schemeClr val="tx1"/>
                 </a:solidFill>
               </a:rPr>
-              <a:t>H</a:t>
+              <a:t>I</a:t>
             </a:r>
           </a:p>
         </p:txBody>
@@ -6070,7 +6015,7 @@
         <p:spPr>
           <a:xfrm>
             <a:off x="5048249" y="9118830"/>
-            <a:ext cx="365760" cy="365760"/>
+            <a:ext cx="456764" cy="365760"/>
           </a:xfrm>
           <a:prstGeom prst="ellipse">
             <a:avLst/>
@@ -6105,7 +6050,7 @@
                   <a:schemeClr val="tx1"/>
                 </a:solidFill>
               </a:rPr>
-              <a:t>AL</a:t>
+              <a:t>AM</a:t>
             </a:r>
           </a:p>
         </p:txBody>
@@ -6201,7 +6146,7 @@
                   <a:schemeClr val="tx1"/>
                 </a:solidFill>
               </a:rPr>
-              <a:t>AM</a:t>
+              <a:t>AN</a:t>
             </a:r>
           </a:p>
         </p:txBody>
@@ -6408,7 +6353,7 @@
                   <a:schemeClr val="tx1"/>
                 </a:solidFill>
               </a:rPr>
-              <a:t>AN</a:t>
+              <a:t>AO</a:t>
             </a:r>
           </a:p>
         </p:txBody>
@@ -6498,7 +6443,7 @@
                   <a:schemeClr val="tx1"/>
                 </a:solidFill>
               </a:rPr>
-              <a:t>I</a:t>
+              <a:t>J</a:t>
             </a:r>
           </a:p>
         </p:txBody>
@@ -6690,7 +6635,7 @@
                     <a:schemeClr val="tx1"/>
                   </a:solidFill>
                 </a:rPr>
-                <a:t>AO</a:t>
+                <a:t>AP</a:t>
               </a:r>
             </a:p>
           </p:txBody>
@@ -6780,7 +6725,7 @@
                     <a:schemeClr val="tx1"/>
                   </a:solidFill>
                 </a:rPr>
-                <a:t>J</a:t>
+                <a:t>K</a:t>
               </a:r>
             </a:p>
           </p:txBody>
@@ -6835,7 +6780,7 @@
                   <a:schemeClr val="tx1"/>
                 </a:solidFill>
               </a:rPr>
-              <a:t>BJ</a:t>
+              <a:t>BK</a:t>
             </a:r>
           </a:p>
         </p:txBody>
@@ -6901,8 +6846,8 @@
         </p:nvCxnSpPr>
         <p:spPr>
           <a:xfrm flipV="1">
-            <a:off x="13524134" y="14324636"/>
-            <a:ext cx="402378" cy="50029"/>
+            <a:off x="13636068" y="14324636"/>
+            <a:ext cx="290444" cy="50028"/>
           </a:xfrm>
           <a:prstGeom prst="straightConnector1">
             <a:avLst/>
@@ -7092,7 +7037,7 @@
                     <a:schemeClr val="tx1"/>
                   </a:solidFill>
                 </a:rPr>
-                <a:t>M</a:t>
+                <a:t>N</a:t>
               </a:r>
             </a:p>
           </p:txBody>
@@ -7243,7 +7188,7 @@
                     <a:schemeClr val="tx1"/>
                   </a:solidFill>
                 </a:rPr>
-                <a:t>AU</a:t>
+                <a:t>AV</a:t>
               </a:r>
             </a:p>
           </p:txBody>
@@ -7394,7 +7339,7 @@
                     <a:schemeClr val="tx1"/>
                   </a:solidFill>
                 </a:rPr>
-                <a:t>BN</a:t>
+                <a:t>BO</a:t>
               </a:r>
             </a:p>
           </p:txBody>
@@ -7545,7 +7490,7 @@
                     <a:schemeClr val="tx1"/>
                   </a:solidFill>
                 </a:rPr>
-                <a:t>CG</a:t>
+                <a:t>CH</a:t>
               </a:r>
             </a:p>
           </p:txBody>
@@ -7696,7 +7641,7 @@
                     <a:schemeClr val="tx1"/>
                   </a:solidFill>
                 </a:rPr>
-                <a:t>CX</a:t>
+                <a:t>CY</a:t>
               </a:r>
             </a:p>
           </p:txBody>
@@ -8019,7 +7964,7 @@
                     <a:schemeClr val="tx1"/>
                   </a:solidFill>
                 </a:rPr>
-                <a:t>N</a:t>
+                <a:t>O</a:t>
               </a:r>
             </a:p>
           </p:txBody>
@@ -8135,8 +8080,8 @@
           </p:nvSpPr>
           <p:spPr>
             <a:xfrm>
-              <a:off x="3733207" y="16054212"/>
-              <a:ext cx="365760" cy="365760"/>
+              <a:off x="3733206" y="16054212"/>
+              <a:ext cx="417773" cy="365760"/>
             </a:xfrm>
             <a:prstGeom prst="ellipse">
               <a:avLst/>
@@ -8170,7 +8115,7 @@
                     <a:schemeClr val="tx1"/>
                   </a:solidFill>
                 </a:rPr>
-                <a:t>AV</a:t>
+                <a:t>AW</a:t>
               </a:r>
             </a:p>
           </p:txBody>
@@ -8321,7 +8266,7 @@
                     <a:schemeClr val="tx1"/>
                   </a:solidFill>
                 </a:rPr>
-                <a:t>BO</a:t>
+                <a:t>BP</a:t>
               </a:r>
             </a:p>
           </p:txBody>
@@ -8376,7 +8321,7 @@
                     <a:schemeClr val="tx1"/>
                   </a:solidFill>
                 </a:rPr>
-                <a:t>CH</a:t>
+                <a:t>CI</a:t>
               </a:r>
             </a:p>
           </p:txBody>
@@ -8803,7 +8748,7 @@
                     <a:schemeClr val="tx1"/>
                   </a:solidFill>
                 </a:rPr>
-                <a:t>AW</a:t>
+                <a:t>AX</a:t>
               </a:r>
             </a:p>
           </p:txBody>
@@ -8858,7 +8803,7 @@
                     <a:schemeClr val="tx1"/>
                   </a:solidFill>
                 </a:rPr>
-                <a:t>BP</a:t>
+                <a:t>BQ</a:t>
               </a:r>
             </a:p>
           </p:txBody>
@@ -8968,7 +8913,7 @@
                     <a:schemeClr val="tx1"/>
                   </a:solidFill>
                 </a:rPr>
-                <a:t>O</a:t>
+                <a:t>P</a:t>
               </a:r>
             </a:p>
           </p:txBody>
@@ -9296,7 +9241,7 @@
                     <a:schemeClr val="tx1"/>
                   </a:solidFill>
                 </a:rPr>
-                <a:t>AY</a:t>
+                <a:t>AZ</a:t>
               </a:r>
             </a:p>
           </p:txBody>
@@ -9599,7 +9544,7 @@
                     <a:schemeClr val="tx1"/>
                   </a:solidFill>
                 </a:rPr>
-                <a:t>CY</a:t>
+                <a:t>CZ</a:t>
               </a:r>
             </a:p>
           </p:txBody>
@@ -9751,7 +9696,7 @@
                     <a:schemeClr val="tx1"/>
                   </a:solidFill>
                 </a:rPr>
-                <a:t>CI</a:t>
+                <a:t>CJ</a:t>
               </a:r>
             </a:p>
           </p:txBody>
@@ -9806,7 +9751,7 @@
                     <a:schemeClr val="tx1"/>
                   </a:solidFill>
                 </a:rPr>
-                <a:t>AX</a:t>
+                <a:t>AY</a:t>
               </a:r>
             </a:p>
           </p:txBody>
@@ -10056,7 +10001,7 @@
                   <a:schemeClr val="tx1"/>
                 </a:solidFill>
               </a:rPr>
-              <a:t>P</a:t>
+              <a:t>Q</a:t>
             </a:r>
           </a:p>
         </p:txBody>
@@ -10207,7 +10152,7 @@
                   <a:schemeClr val="tx1"/>
                 </a:solidFill>
               </a:rPr>
-              <a:t>AZ</a:t>
+              <a:t>BA</a:t>
             </a:r>
           </a:p>
         </p:txBody>
@@ -10509,7 +10454,7 @@
                   <a:schemeClr val="tx1"/>
                 </a:solidFill>
               </a:rPr>
-              <a:t>CJ</a:t>
+              <a:t>CK</a:t>
             </a:r>
           </a:p>
         </p:txBody>
@@ -10660,7 +10605,7 @@
                   <a:schemeClr val="tx1"/>
                 </a:solidFill>
               </a:rPr>
-              <a:t>CZ</a:t>
+              <a:t>DA</a:t>
             </a:r>
           </a:p>
         </p:txBody>
@@ -11135,7 +11080,7 @@
                     <a:schemeClr val="tx1"/>
                   </a:solidFill>
                 </a:rPr>
-                <a:t>Q</a:t>
+                <a:t>R</a:t>
               </a:r>
             </a:p>
           </p:txBody>
@@ -11286,7 +11231,7 @@
                     <a:schemeClr val="tx1"/>
                   </a:solidFill>
                 </a:rPr>
-                <a:t>BA</a:t>
+                <a:t>BB</a:t>
               </a:r>
             </a:p>
           </p:txBody>
@@ -11589,7 +11534,7 @@
                     <a:schemeClr val="tx1"/>
                   </a:solidFill>
                 </a:rPr>
-                <a:t>CK</a:t>
+                <a:t>CL</a:t>
               </a:r>
             </a:p>
           </p:txBody>
@@ -11761,7 +11706,7 @@
                     <a:schemeClr val="tx1"/>
                   </a:solidFill>
                 </a:rPr>
-                <a:t>R</a:t>
+                <a:t>S</a:t>
               </a:r>
             </a:p>
           </p:txBody>
@@ -11913,7 +11858,7 @@
                     <a:schemeClr val="tx1"/>
                   </a:solidFill>
                 </a:rPr>
-                <a:t>BB</a:t>
+                <a:t>BC</a:t>
               </a:r>
             </a:p>
           </p:txBody>
@@ -12109,8 +12054,8 @@
             </p:nvCxnSpPr>
             <p:spPr>
               <a:xfrm>
-                <a:off x="2572134" y="2100855"/>
-                <a:ext cx="259380" cy="0"/>
+                <a:off x="2572135" y="2100855"/>
+                <a:ext cx="259379" cy="0"/>
               </a:xfrm>
               <a:prstGeom prst="straightConnector1">
                 <a:avLst/>
@@ -12184,8 +12129,8 @@
           </p:nvSpPr>
           <p:spPr>
             <a:xfrm>
-              <a:off x="5184862" y="3044558"/>
-              <a:ext cx="542360" cy="480060"/>
+              <a:off x="5184860" y="3044558"/>
+              <a:ext cx="740533" cy="480060"/>
             </a:xfrm>
             <a:prstGeom prst="ellipse">
               <a:avLst/>
@@ -12219,7 +12164,7 @@
                     <a:schemeClr val="tx1"/>
                   </a:solidFill>
                 </a:rPr>
-                <a:t>CL</a:t>
+                <a:t>CM</a:t>
               </a:r>
             </a:p>
           </p:txBody>
@@ -12238,10 +12183,10 @@
           </p:nvGrpSpPr>
           <p:grpSpPr>
             <a:xfrm>
-              <a:off x="5727218" y="3262462"/>
-              <a:ext cx="436898" cy="274049"/>
-              <a:chOff x="2395862" y="2084300"/>
-              <a:chExt cx="304172" cy="131774"/>
+              <a:off x="5847680" y="3262462"/>
+              <a:ext cx="316437" cy="274049"/>
+              <a:chOff x="2479728" y="2084300"/>
+              <a:chExt cx="220306" cy="131774"/>
             </a:xfrm>
           </p:grpSpPr>
           <p:cxnSp>
@@ -12261,8 +12206,8 @@
             </p:nvCxnSpPr>
             <p:spPr>
               <a:xfrm>
-                <a:off x="2395862" y="2094939"/>
-                <a:ext cx="304172" cy="0"/>
+                <a:off x="2533832" y="2094939"/>
+                <a:ext cx="166202" cy="0"/>
               </a:xfrm>
               <a:prstGeom prst="straightConnector1">
                 <a:avLst/>
@@ -12371,7 +12316,7 @@
                     <a:schemeClr val="tx1"/>
                   </a:solidFill>
                 </a:rPr>
-                <a:t>DA</a:t>
+                <a:t>DB</a:t>
               </a:r>
             </a:p>
           </p:txBody>
@@ -12849,7 +12794,7 @@
                       <a:schemeClr val="tx1"/>
                     </a:solidFill>
                   </a:rPr>
-                  <a:t>S</a:t>
+                  <a:t>T</a:t>
                 </a:r>
               </a:p>
             </p:txBody>
@@ -13002,7 +12947,7 @@
                       <a:schemeClr val="tx1"/>
                     </a:solidFill>
                   </a:rPr>
-                  <a:t>BD</a:t>
+                  <a:t>BE</a:t>
                 </a:r>
               </a:p>
             </p:txBody>
@@ -13308,7 +13253,7 @@
                       <a:schemeClr val="tx1"/>
                     </a:solidFill>
                   </a:rPr>
-                  <a:t>CN</a:t>
+                  <a:t>CO</a:t>
                 </a:r>
               </a:p>
             </p:txBody>
@@ -13919,7 +13864,7 @@
                       <a:schemeClr val="tx1"/>
                     </a:solidFill>
                   </a:rPr>
-                  <a:t>EE</a:t>
+                  <a:t>EF</a:t>
                 </a:r>
               </a:p>
             </p:txBody>
@@ -14072,7 +14017,7 @@
                       <a:schemeClr val="tx1"/>
                     </a:solidFill>
                   </a:rPr>
-                  <a:t>EI</a:t>
+                  <a:t>EK</a:t>
                 </a:r>
               </a:p>
             </p:txBody>
@@ -14225,7 +14170,7 @@
                       <a:schemeClr val="tx1"/>
                     </a:solidFill>
                   </a:rPr>
-                  <a:t>EN</a:t>
+                  <a:t>EO</a:t>
                 </a:r>
               </a:p>
             </p:txBody>
@@ -14417,7 +14362,7 @@
                     <a:schemeClr val="tx1"/>
                   </a:solidFill>
                 </a:rPr>
-                <a:t>BC</a:t>
+                <a:t>BD</a:t>
               </a:r>
             </a:p>
           </p:txBody>
@@ -14723,7 +14668,7 @@
                     <a:schemeClr val="tx1"/>
                   </a:solidFill>
                 </a:rPr>
-                <a:t>CM</a:t>
+                <a:t>CN</a:t>
               </a:r>
             </a:p>
           </p:txBody>
@@ -14875,7 +14820,7 @@
                     <a:schemeClr val="tx1"/>
                   </a:solidFill>
                 </a:rPr>
-                <a:t>DB</a:t>
+                <a:t>DC</a:t>
               </a:r>
             </a:p>
           </p:txBody>
@@ -15236,7 +15181,7 @@
                     <a:schemeClr val="tx1"/>
                   </a:solidFill>
                 </a:rPr>
-                <a:t>EM</a:t>
+                <a:t>EJ</a:t>
               </a:r>
             </a:p>
           </p:txBody>
@@ -15389,7 +15334,7 @@
                     <a:schemeClr val="tx1"/>
                   </a:solidFill>
                 </a:rPr>
-                <a:t>ED</a:t>
+                <a:t>EE</a:t>
               </a:r>
             </a:p>
           </p:txBody>
@@ -15542,7 +15487,7 @@
                     <a:schemeClr val="tx1"/>
                   </a:solidFill>
                 </a:rPr>
-                <a:t>T</a:t>
+                <a:t>U</a:t>
               </a:r>
             </a:p>
           </p:txBody>
@@ -16103,7 +16048,7 @@
                     <a:schemeClr val="tx1"/>
                   </a:solidFill>
                 </a:rPr>
-                <a:t>BF</a:t>
+                <a:t>BG</a:t>
               </a:r>
             </a:p>
           </p:txBody>
@@ -16405,7 +16350,7 @@
                     <a:schemeClr val="tx1"/>
                   </a:solidFill>
                 </a:rPr>
-                <a:t>CQ</a:t>
+                <a:t>CR</a:t>
               </a:r>
             </a:p>
           </p:txBody>
@@ -16763,7 +16708,7 @@
                     <a:schemeClr val="tx1"/>
                   </a:solidFill>
                 </a:rPr>
-                <a:t>BE</a:t>
+                <a:t>BF</a:t>
               </a:r>
             </a:p>
           </p:txBody>
@@ -17217,7 +17162,7 @@
                     <a:schemeClr val="tx1"/>
                   </a:solidFill>
                 </a:rPr>
-                <a:t>CP</a:t>
+                <a:t>CQ</a:t>
               </a:r>
             </a:p>
           </p:txBody>
@@ -17520,7 +17465,7 @@
                     <a:schemeClr val="tx1"/>
                   </a:solidFill>
                 </a:rPr>
-                <a:t>CO</a:t>
+                <a:t>CP</a:t>
               </a:r>
             </a:p>
           </p:txBody>
@@ -17747,7 +17692,7 @@
                     <a:schemeClr val="tx1"/>
                   </a:solidFill>
                 </a:rPr>
-                <a:t>U</a:t>
+                <a:t>V</a:t>
               </a:r>
             </a:p>
           </p:txBody>
@@ -17900,7 +17845,7 @@
                     <a:schemeClr val="tx1"/>
                   </a:solidFill>
                 </a:rPr>
-                <a:t>BG</a:t>
+                <a:t>BH</a:t>
               </a:r>
             </a:p>
           </p:txBody>
@@ -18206,7 +18151,7 @@
                     <a:schemeClr val="tx1"/>
                   </a:solidFill>
                 </a:rPr>
-                <a:t>CR</a:t>
+                <a:t>CS</a:t>
               </a:r>
             </a:p>
           </p:txBody>
@@ -18534,7 +18479,7 @@
                     <a:schemeClr val="tx1"/>
                   </a:solidFill>
                 </a:rPr>
-                <a:t>V</a:t>
+                <a:t>W</a:t>
               </a:r>
             </a:p>
           </p:txBody>
@@ -18708,7 +18653,7 @@
                     <a:schemeClr val="tx1"/>
                   </a:solidFill>
                 </a:rPr>
-                <a:t>W</a:t>
+                <a:t>X</a:t>
               </a:r>
             </a:p>
           </p:txBody>
@@ -18882,7 +18827,7 @@
                     <a:schemeClr val="tx1"/>
                   </a:solidFill>
                 </a:rPr>
-                <a:t>X</a:t>
+                <a:t>Y</a:t>
               </a:r>
             </a:p>
           </p:txBody>
@@ -18977,7 +18922,7 @@
                       <a:schemeClr val="tx1"/>
                     </a:solidFill>
                   </a:rPr>
-                  <a:t>Y</a:t>
+                  <a:t>Z</a:t>
                 </a:r>
               </a:p>
             </p:txBody>
@@ -19130,7 +19075,7 @@
                       <a:schemeClr val="tx1"/>
                     </a:solidFill>
                   </a:rPr>
-                  <a:t>BH</a:t>
+                  <a:t>BI</a:t>
                 </a:r>
               </a:p>
             </p:txBody>
@@ -19435,7 +19380,7 @@
                       <a:schemeClr val="tx1"/>
                     </a:solidFill>
                   </a:rPr>
-                  <a:t>CS</a:t>
+                  <a:t>CT</a:t>
                 </a:r>
               </a:p>
             </p:txBody>
@@ -20010,8 +19955,8 @@
             </p:nvSpPr>
             <p:spPr>
               <a:xfrm>
-                <a:off x="10274211" y="4150115"/>
-                <a:ext cx="659633" cy="402737"/>
+                <a:off x="10274210" y="4150115"/>
+                <a:ext cx="752321" cy="402737"/>
               </a:xfrm>
               <a:prstGeom prst="ellipse">
                 <a:avLst/>
@@ -20045,7 +19990,7 @@
                       <a:schemeClr val="tx1"/>
                     </a:solidFill>
                   </a:rPr>
-                  <a:t>EF</a:t>
+                  <a:t>EG</a:t>
                 </a:r>
               </a:p>
             </p:txBody>
@@ -20064,10 +20009,10 @@
             </p:nvGrpSpPr>
             <p:grpSpPr>
               <a:xfrm>
-                <a:off x="10933844" y="4336322"/>
-                <a:ext cx="508482" cy="475418"/>
-                <a:chOff x="1633138" y="1918436"/>
-                <a:chExt cx="387415" cy="3300946"/>
+                <a:off x="11026531" y="4336322"/>
+                <a:ext cx="415796" cy="475418"/>
+                <a:chOff x="1703756" y="1918436"/>
+                <a:chExt cx="316797" cy="3300946"/>
               </a:xfrm>
             </p:grpSpPr>
             <p:cxnSp>
@@ -20088,8 +20033,8 @@
               </p:nvCxnSpPr>
               <p:spPr>
                 <a:xfrm flipV="1">
-                  <a:off x="1633138" y="1918436"/>
-                  <a:ext cx="387415" cy="105272"/>
+                  <a:off x="1703756" y="1918436"/>
+                  <a:ext cx="316797" cy="105272"/>
                 </a:xfrm>
                 <a:prstGeom prst="straightConnector1">
                   <a:avLst/>
@@ -20198,7 +20143,7 @@
                       <a:schemeClr val="tx1"/>
                     </a:solidFill>
                   </a:rPr>
-                  <a:t>EJ</a:t>
+                  <a:t>EL</a:t>
                 </a:r>
               </a:p>
             </p:txBody>
@@ -20352,7 +20297,7 @@
                       <a:schemeClr val="tx1"/>
                     </a:solidFill>
                   </a:rPr>
-                  <a:t>ER</a:t>
+                  <a:t>ES</a:t>
                 </a:r>
               </a:p>
             </p:txBody>
@@ -20505,7 +20450,7 @@
                       <a:schemeClr val="tx1"/>
                     </a:solidFill>
                   </a:rPr>
-                  <a:t>EO</a:t>
+                  <a:t>EP</a:t>
                 </a:r>
               </a:p>
             </p:txBody>
@@ -20721,7 +20666,7 @@
           <p:spPr>
             <a:xfrm>
               <a:off x="2249403" y="3044558"/>
-              <a:ext cx="480060" cy="480060"/>
+              <a:ext cx="643770" cy="480060"/>
             </a:xfrm>
             <a:prstGeom prst="ellipse">
               <a:avLst/>
@@ -20745,7 +20690,7 @@
             </a:fontRef>
           </p:style>
           <p:txBody>
-            <a:bodyPr rtlCol="0" anchor="ctr"/>
+            <a:bodyPr lIns="0" tIns="0" rIns="0" bIns="0" rtlCol="0" anchor="ctr"/>
             <a:lstStyle/>
             <a:p>
               <a:pPr algn="ctr"/>
@@ -20755,7 +20700,7 @@
                     <a:schemeClr val="tx1"/>
                   </a:solidFill>
                 </a:rPr>
-                <a:t>Z</a:t>
+                <a:t>AA</a:t>
               </a:r>
             </a:p>
           </p:txBody>
@@ -20774,10 +20719,10 @@
           </p:nvGrpSpPr>
           <p:grpSpPr>
             <a:xfrm>
-              <a:off x="2729461" y="3237715"/>
-              <a:ext cx="550524" cy="274049"/>
-              <a:chOff x="2725337" y="2036628"/>
-              <a:chExt cx="419447" cy="208800"/>
+              <a:off x="2880731" y="3237715"/>
+              <a:ext cx="399256" cy="274049"/>
+              <a:chOff x="2840589" y="2036628"/>
+              <a:chExt cx="304195" cy="208800"/>
             </a:xfrm>
           </p:grpSpPr>
           <p:cxnSp>
@@ -20796,9 +20741,9 @@
               <p:nvPr/>
             </p:nvCxnSpPr>
             <p:spPr>
-              <a:xfrm>
-                <a:off x="2725337" y="2072338"/>
-                <a:ext cx="419447" cy="0"/>
+              <a:xfrm flipV="1">
+                <a:off x="2850069" y="2072338"/>
+                <a:ext cx="294715" cy="3"/>
               </a:xfrm>
               <a:prstGeom prst="straightConnector1">
                 <a:avLst/>
@@ -20907,7 +20852,7 @@
                     <a:schemeClr val="tx1"/>
                   </a:solidFill>
                 </a:rPr>
-                <a:t>BI</a:t>
+                <a:t>BJ</a:t>
               </a:r>
             </a:p>
           </p:txBody>
@@ -21213,7 +21158,7 @@
                     <a:schemeClr val="tx1"/>
                   </a:solidFill>
                 </a:rPr>
-                <a:t>CT</a:t>
+                <a:t>CU</a:t>
               </a:r>
             </a:p>
           </p:txBody>
@@ -21825,7 +21770,7 @@
                     <a:schemeClr val="tx1"/>
                   </a:solidFill>
                 </a:rPr>
-                <a:t>EV</a:t>
+                <a:t>EW</a:t>
               </a:r>
             </a:p>
           </p:txBody>
@@ -21978,7 +21923,7 @@
                     <a:schemeClr val="tx1"/>
                   </a:solidFill>
                 </a:rPr>
-                <a:t>EG</a:t>
+                <a:t>EH</a:t>
               </a:r>
             </a:p>
           </p:txBody>
@@ -22094,8 +22039,8 @@
           </p:nvSpPr>
           <p:spPr>
             <a:xfrm>
-              <a:off x="10385716" y="3054336"/>
-              <a:ext cx="529336" cy="443944"/>
+              <a:off x="10385716" y="3064178"/>
+              <a:ext cx="775595" cy="434099"/>
             </a:xfrm>
             <a:prstGeom prst="ellipse">
               <a:avLst/>
@@ -22129,7 +22074,7 @@
                     <a:schemeClr val="tx1"/>
                   </a:solidFill>
                 </a:rPr>
-                <a:t>EK</a:t>
+                <a:t>EM</a:t>
               </a:r>
             </a:p>
           </p:txBody>
@@ -22148,10 +22093,10 @@
           </p:nvGrpSpPr>
           <p:grpSpPr>
             <a:xfrm>
-              <a:off x="10915052" y="3261558"/>
-              <a:ext cx="638778" cy="342843"/>
-              <a:chOff x="1734936" y="3160651"/>
-              <a:chExt cx="486687" cy="261214"/>
+              <a:off x="11161312" y="3261558"/>
+              <a:ext cx="392518" cy="342843"/>
+              <a:chOff x="1922558" y="3160651"/>
+              <a:chExt cx="299060" cy="261214"/>
             </a:xfrm>
           </p:grpSpPr>
           <p:cxnSp>
@@ -22172,8 +22117,8 @@
             </p:nvCxnSpPr>
             <p:spPr>
               <a:xfrm flipV="1">
-                <a:off x="1734936" y="3160651"/>
-                <a:ext cx="486687" cy="11239"/>
+                <a:off x="1922558" y="3160651"/>
+                <a:ext cx="299060" cy="14987"/>
               </a:xfrm>
               <a:prstGeom prst="straightConnector1">
                 <a:avLst/>
@@ -22247,8 +22192,8 @@
           </p:nvSpPr>
           <p:spPr>
             <a:xfrm>
-              <a:off x="11553830" y="3035135"/>
-              <a:ext cx="529336" cy="452845"/>
+              <a:off x="11553829" y="3035135"/>
+              <a:ext cx="642782" cy="452844"/>
             </a:xfrm>
             <a:prstGeom prst="ellipse">
               <a:avLst/>
@@ -22282,7 +22227,7 @@
                     <a:schemeClr val="tx1"/>
                   </a:solidFill>
                 </a:rPr>
-                <a:t>EP</a:t>
+                <a:t>EQ</a:t>
               </a:r>
             </a:p>
           </p:txBody>
@@ -22301,10 +22246,10 @@
           </p:nvGrpSpPr>
           <p:grpSpPr>
             <a:xfrm>
-              <a:off x="12083168" y="3261561"/>
-              <a:ext cx="722344" cy="310227"/>
-              <a:chOff x="1516392" y="2736707"/>
-              <a:chExt cx="550355" cy="236364"/>
+              <a:off x="12196610" y="3261558"/>
+              <a:ext cx="608900" cy="310231"/>
+              <a:chOff x="1602824" y="2736704"/>
+              <a:chExt cx="463922" cy="236367"/>
             </a:xfrm>
           </p:grpSpPr>
           <p:cxnSp>
@@ -22325,8 +22270,8 @@
             </p:nvCxnSpPr>
             <p:spPr>
               <a:xfrm>
-                <a:off x="1516392" y="2736707"/>
-                <a:ext cx="550355" cy="16173"/>
+                <a:off x="1602824" y="2736704"/>
+                <a:ext cx="463922" cy="16173"/>
               </a:xfrm>
               <a:prstGeom prst="straightConnector1">
                 <a:avLst/>
@@ -22435,7 +22380,7 @@
                     <a:schemeClr val="tx1"/>
                   </a:solidFill>
                 </a:rPr>
-                <a:t>ES</a:t>
+                <a:t>ET</a:t>
               </a:r>
             </a:p>
           </p:txBody>
@@ -22489,7 +22434,7 @@
                     <a:schemeClr val="tx1"/>
                   </a:solidFill>
                 </a:rPr>
-                <a:t>EU</a:t>
+                <a:t>EV</a:t>
               </a:r>
             </a:p>
           </p:txBody>
@@ -22794,7 +22739,7 @@
                     <a:schemeClr val="tx1"/>
                   </a:solidFill>
                 </a:rPr>
-                <a:t>AA</a:t>
+                <a:t>AB</a:t>
               </a:r>
             </a:p>
           </p:txBody>
@@ -22968,7 +22913,7 @@
                     <a:schemeClr val="tx1"/>
                   </a:solidFill>
                 </a:rPr>
-                <a:t>AB</a:t>
+                <a:t>AC</a:t>
               </a:r>
             </a:p>
           </p:txBody>
@@ -23142,7 +23087,7 @@
                     <a:schemeClr val="tx1"/>
                   </a:solidFill>
                 </a:rPr>
-                <a:t>AC</a:t>
+                <a:t>AD</a:t>
               </a:r>
             </a:p>
           </p:txBody>
@@ -23316,7 +23261,7 @@
                     <a:schemeClr val="tx1"/>
                   </a:solidFill>
                 </a:rPr>
-                <a:t>AD</a:t>
+                <a:t>AE</a:t>
               </a:r>
             </a:p>
           </p:txBody>
@@ -23490,7 +23435,7 @@
                     <a:schemeClr val="tx1"/>
                   </a:solidFill>
                 </a:rPr>
-                <a:t>AE</a:t>
+                <a:t>AF</a:t>
               </a:r>
             </a:p>
           </p:txBody>
@@ -23664,7 +23609,7 @@
                     <a:schemeClr val="tx1"/>
                   </a:solidFill>
                 </a:rPr>
-                <a:t>AF</a:t>
+                <a:t>AG</a:t>
               </a:r>
             </a:p>
           </p:txBody>
@@ -23838,7 +23783,7 @@
                     <a:schemeClr val="tx1"/>
                   </a:solidFill>
                 </a:rPr>
-                <a:t>AG</a:t>
+                <a:t>AH</a:t>
               </a:r>
             </a:p>
           </p:txBody>
@@ -23980,7 +23925,7 @@
                   <a:schemeClr val="tx1"/>
                 </a:solidFill>
               </a:rPr>
-              <a:t>G</a:t>
+              <a:t>H</a:t>
             </a:r>
           </a:p>
         </p:txBody>
@@ -24641,7 +24586,7 @@
                     <a:schemeClr val="tx1"/>
                   </a:solidFill>
                 </a:rPr>
-                <a:t>AP</a:t>
+                <a:t>AQ</a:t>
               </a:r>
             </a:p>
           </p:txBody>
@@ -24731,7 +24676,7 @@
                     <a:schemeClr val="tx1"/>
                   </a:solidFill>
                 </a:rPr>
-                <a:t>K</a:t>
+                <a:t>L</a:t>
               </a:r>
             </a:p>
           </p:txBody>
@@ -24923,7 +24868,7 @@
                   <a:schemeClr val="tx1"/>
                 </a:solidFill>
               </a:rPr>
-              <a:t>L</a:t>
+              <a:t>M</a:t>
             </a:r>
           </a:p>
         </p:txBody>
@@ -25074,7 +25019,7 @@
                   <a:schemeClr val="tx1"/>
                 </a:solidFill>
               </a:rPr>
-              <a:t>AQ</a:t>
+              <a:t>AR</a:t>
             </a:r>
           </a:p>
         </p:txBody>
@@ -25324,7 +25269,7 @@
                   <a:schemeClr val="tx1"/>
                 </a:solidFill>
               </a:rPr>
-              <a:t>CC</a:t>
+              <a:t>CD</a:t>
             </a:r>
           </a:p>
         </p:txBody>
@@ -25475,7 +25420,7 @@
                   <a:schemeClr val="tx1"/>
                 </a:solidFill>
               </a:rPr>
-              <a:t>CU</a:t>
+              <a:t>CV</a:t>
             </a:r>
           </a:p>
         </p:txBody>
@@ -25929,7 +25874,7 @@
                   <a:schemeClr val="tx1"/>
                 </a:solidFill>
               </a:rPr>
-              <a:t>DU</a:t>
+              <a:t>EC</a:t>
             </a:r>
           </a:p>
         </p:txBody>
@@ -26122,7 +26067,7 @@
                   <a:schemeClr val="tx1"/>
                 </a:solidFill>
               </a:rPr>
-              <a:t>AR</a:t>
+              <a:t>AS</a:t>
             </a:r>
           </a:p>
         </p:txBody>
@@ -26275,7 +26220,7 @@
                   <a:schemeClr val="tx1"/>
                 </a:solidFill>
               </a:rPr>
-              <a:t>BK</a:t>
+              <a:t>BL</a:t>
             </a:r>
           </a:p>
         </p:txBody>
@@ -26428,7 +26373,7 @@
                   <a:schemeClr val="tx1"/>
                 </a:solidFill>
               </a:rPr>
-              <a:t>CD</a:t>
+              <a:t>CE</a:t>
             </a:r>
           </a:p>
         </p:txBody>
@@ -26448,7 +26393,7 @@
         <p:spPr>
           <a:xfrm>
             <a:off x="9780769" y="13001928"/>
-            <a:ext cx="480089" cy="336396"/>
+            <a:ext cx="638924" cy="336396"/>
           </a:xfrm>
           <a:prstGeom prst="ellipse">
             <a:avLst/>
@@ -26483,7 +26428,7 @@
                   <a:schemeClr val="tx1"/>
                 </a:solidFill>
               </a:rPr>
-              <a:t>CV</a:t>
+              <a:t>CW</a:t>
             </a:r>
           </a:p>
         </p:txBody>
@@ -26718,7 +26663,7 @@
                   <a:schemeClr val="tx1"/>
                 </a:solidFill>
               </a:rPr>
-              <a:t>AS</a:t>
+              <a:t>AT</a:t>
             </a:r>
           </a:p>
         </p:txBody>
@@ -26737,10 +26682,10 @@
         </p:nvGrpSpPr>
         <p:grpSpPr>
           <a:xfrm>
-            <a:off x="6917241" y="13918159"/>
-            <a:ext cx="982037" cy="230832"/>
-            <a:chOff x="2262953" y="2058566"/>
-            <a:chExt cx="982037" cy="230832"/>
+            <a:off x="6917241" y="13913601"/>
+            <a:ext cx="982037" cy="235390"/>
+            <a:chOff x="2262953" y="2054008"/>
+            <a:chExt cx="982037" cy="235390"/>
           </a:xfrm>
         </p:grpSpPr>
         <p:cxnSp>
@@ -26760,9 +26705,9 @@
             <p:nvPr/>
           </p:nvCxnSpPr>
           <p:spPr>
-            <a:xfrm>
-              <a:off x="2262953" y="2072485"/>
-              <a:ext cx="982037" cy="16060"/>
+            <a:xfrm flipV="1">
+              <a:off x="2262953" y="2054008"/>
+              <a:ext cx="982037" cy="18477"/>
             </a:xfrm>
             <a:prstGeom prst="straightConnector1">
               <a:avLst/>
@@ -26836,8 +26781,8 @@
         </p:nvSpPr>
         <p:spPr>
           <a:xfrm>
-            <a:off x="7899278" y="13765258"/>
-            <a:ext cx="365760" cy="365760"/>
+            <a:off x="7899278" y="13730721"/>
+            <a:ext cx="418287" cy="365760"/>
           </a:xfrm>
           <a:prstGeom prst="ellipse">
             <a:avLst/>
@@ -26871,7 +26816,7 @@
                   <a:schemeClr val="tx1"/>
                 </a:solidFill>
               </a:rPr>
-              <a:t>BL</a:t>
+              <a:t>BM</a:t>
             </a:r>
           </a:p>
         </p:txBody>
@@ -26890,10 +26835,10 @@
         </p:nvGrpSpPr>
         <p:grpSpPr>
           <a:xfrm>
-            <a:off x="8262417" y="13848079"/>
-            <a:ext cx="533436" cy="230832"/>
-            <a:chOff x="2704902" y="2010614"/>
-            <a:chExt cx="533436" cy="230832"/>
+            <a:off x="8317565" y="13890716"/>
+            <a:ext cx="484940" cy="230832"/>
+            <a:chOff x="2810641" y="2086646"/>
+            <a:chExt cx="484940" cy="230832"/>
           </a:xfrm>
         </p:grpSpPr>
         <p:cxnSp>
@@ -26907,13 +26852,15 @@
             </p:cNvPr>
             <p:cNvCxnSpPr>
               <a:cxnSpLocks/>
+              <a:stCxn id="182" idx="6"/>
+              <a:endCxn id="186" idx="2"/>
             </p:cNvCxnSpPr>
             <p:nvPr/>
           </p:nvCxnSpPr>
           <p:spPr>
             <a:xfrm>
-              <a:off x="2704902" y="2054141"/>
-              <a:ext cx="533436" cy="0"/>
+              <a:off x="2810641" y="2109531"/>
+              <a:ext cx="484940" cy="4558"/>
             </a:xfrm>
             <a:prstGeom prst="straightConnector1">
               <a:avLst/>
@@ -26951,7 +26898,7 @@
           </p:nvSpPr>
           <p:spPr>
             <a:xfrm>
-              <a:off x="2842733" y="2010614"/>
+              <a:off x="2887468" y="2086646"/>
               <a:ext cx="150495" cy="230832"/>
             </a:xfrm>
             <a:prstGeom prst="rect">
@@ -27023,7 +26970,7 @@
                   <a:schemeClr val="tx1"/>
                 </a:solidFill>
               </a:rPr>
-              <a:t>CE</a:t>
+              <a:t>CF</a:t>
             </a:r>
           </a:p>
         </p:txBody>
@@ -27082,10 +27029,10 @@
         </p:nvGrpSpPr>
         <p:grpSpPr>
           <a:xfrm>
-            <a:off x="5987369" y="14144085"/>
-            <a:ext cx="8522728" cy="561547"/>
+            <a:off x="5987369" y="14144087"/>
+            <a:ext cx="8522728" cy="638815"/>
             <a:chOff x="2786755" y="14028186"/>
-            <a:chExt cx="13547336" cy="983072"/>
+            <a:chExt cx="13547336" cy="1118341"/>
           </a:xfrm>
         </p:grpSpPr>
         <p:grpSp>
@@ -27234,7 +27181,7 @@
                     <a:schemeClr val="tx1"/>
                   </a:solidFill>
                 </a:rPr>
-                <a:t>AT</a:t>
+                <a:t>AU</a:t>
               </a:r>
             </a:p>
           </p:txBody>
@@ -27288,7 +27235,7 @@
                     <a:schemeClr val="tx1"/>
                   </a:solidFill>
                 </a:rPr>
-                <a:t>BM</a:t>
+                <a:t>BN</a:t>
               </a:r>
             </a:p>
           </p:txBody>
@@ -27441,7 +27388,7 @@
                     <a:schemeClr val="tx1"/>
                   </a:solidFill>
                 </a:rPr>
-                <a:t>CF</a:t>
+                <a:t>CG</a:t>
               </a:r>
             </a:p>
           </p:txBody>
@@ -27461,9 +27408,9 @@
           <p:grpSpPr>
             <a:xfrm>
               <a:off x="6487552" y="14513082"/>
-              <a:ext cx="622435" cy="167814"/>
+              <a:ext cx="622435" cy="624102"/>
               <a:chOff x="1997415" y="869561"/>
-              <a:chExt cx="474237" cy="1492515"/>
+              <a:chExt cx="474237" cy="5550680"/>
             </a:xfrm>
           </p:grpSpPr>
           <p:cxnSp>
@@ -27523,8 +27470,8 @@
             </p:nvSpPr>
             <p:spPr>
               <a:xfrm>
-                <a:off x="1997415" y="2153279"/>
-                <a:ext cx="150495" cy="208797"/>
+                <a:off x="1997415" y="2153281"/>
+                <a:ext cx="150495" cy="4266960"/>
               </a:xfrm>
               <a:prstGeom prst="rect">
                 <a:avLst/>
@@ -27539,7 +27486,7 @@
               <a:p>
                 <a:r>
                   <a:rPr lang="en-US" sz="1181" b="1" dirty="0"/>
-                  <a:t>n</a:t>
+                  <a:t>i</a:t>
                 </a:r>
               </a:p>
             </p:txBody>
@@ -27594,7 +27541,7 @@
                     <a:schemeClr val="tx1"/>
                   </a:solidFill>
                 </a:rPr>
-                <a:t>CW</a:t>
+                <a:t>CX</a:t>
               </a:r>
             </a:p>
           </p:txBody>
@@ -27614,9 +27561,9 @@
           <p:grpSpPr>
             <a:xfrm>
               <a:off x="7859738" y="14509072"/>
-              <a:ext cx="452040" cy="431740"/>
+              <a:ext cx="452040" cy="637455"/>
               <a:chOff x="2130448" y="1033918"/>
-              <a:chExt cx="344413" cy="3237998"/>
+              <a:chExt cx="344413" cy="4780838"/>
             </a:xfrm>
           </p:grpSpPr>
           <p:cxnSp>
@@ -27676,8 +27623,8 @@
             </p:nvSpPr>
             <p:spPr>
               <a:xfrm>
-                <a:off x="2130448" y="2216586"/>
-                <a:ext cx="150496" cy="2055330"/>
+                <a:off x="2130448" y="2216585"/>
+                <a:ext cx="150496" cy="3598171"/>
               </a:xfrm>
               <a:prstGeom prst="rect">
                 <a:avLst/>
@@ -27692,7 +27639,7 @@
               <a:p>
                 <a:r>
                   <a:rPr lang="en-US" sz="1181" b="1" dirty="0"/>
-                  <a:t>o</a:t>
+                  <a:t>n</a:t>
                 </a:r>
               </a:p>
             </p:txBody>
@@ -27766,10 +27713,10 @@
           </p:nvGrpSpPr>
           <p:grpSpPr>
             <a:xfrm>
-              <a:off x="13598698" y="14431856"/>
-              <a:ext cx="432242" cy="563628"/>
-              <a:chOff x="2939558" y="2036528"/>
-              <a:chExt cx="329328" cy="507787"/>
+              <a:off x="13639628" y="14431849"/>
+              <a:ext cx="569242" cy="563636"/>
+              <a:chOff x="2970748" y="2036521"/>
+              <a:chExt cx="433710" cy="507794"/>
             </a:xfrm>
           </p:grpSpPr>
           <p:cxnSp>
@@ -27790,8 +27737,8 @@
             </p:nvCxnSpPr>
             <p:spPr>
               <a:xfrm flipV="1">
-                <a:off x="2939558" y="2036528"/>
-                <a:ext cx="329328" cy="37608"/>
+                <a:off x="3074511" y="2036521"/>
+                <a:ext cx="329947" cy="37613"/>
               </a:xfrm>
               <a:prstGeom prst="straightConnector1">
                 <a:avLst/>
@@ -27901,7 +27848,7 @@
                     <a:schemeClr val="tx1"/>
                   </a:solidFill>
                 </a:rPr>
-                <a:t>ET</a:t>
+                <a:t>EU</a:t>
               </a:r>
             </a:p>
           </p:txBody>
@@ -28206,7 +28153,7 @@
                     <a:schemeClr val="tx1"/>
                   </a:solidFill>
                 </a:rPr>
-                <a:t>EC</a:t>
+                <a:t>ED</a:t>
               </a:r>
             </a:p>
           </p:txBody>
@@ -28359,7 +28306,7 @@
                     <a:schemeClr val="tx1"/>
                   </a:solidFill>
                 </a:rPr>
-                <a:t>EH</a:t>
+                <a:t>EI</a:t>
               </a:r>
             </a:p>
           </p:txBody>
@@ -28378,9 +28325,9 @@
           </p:nvGrpSpPr>
           <p:grpSpPr>
             <a:xfrm>
-              <a:off x="12347023" y="14473598"/>
+              <a:off x="12347021" y="14473598"/>
               <a:ext cx="515777" cy="231758"/>
-              <a:chOff x="1717423" y="1476035"/>
+              <a:chOff x="1717421" y="1476035"/>
               <a:chExt cx="392970" cy="1497036"/>
             </a:xfrm>
           </p:grpSpPr>
@@ -28402,8 +28349,8 @@
             </p:nvCxnSpPr>
             <p:spPr>
               <a:xfrm flipV="1">
-                <a:off x="1717423" y="1476035"/>
-                <a:ext cx="392970" cy="28900"/>
+                <a:off x="1717421" y="1476035"/>
+                <a:ext cx="392970" cy="28904"/>
               </a:xfrm>
               <a:prstGeom prst="straightConnector1">
                 <a:avLst/>
@@ -28477,8 +28424,8 @@
           </p:nvSpPr>
           <p:spPr>
             <a:xfrm>
-              <a:off x="12862797" y="14266591"/>
-              <a:ext cx="735904" cy="414014"/>
+              <a:off x="12862798" y="14266591"/>
+              <a:ext cx="913019" cy="414015"/>
             </a:xfrm>
             <a:prstGeom prst="ellipse">
               <a:avLst/>
@@ -28512,7 +28459,7 @@
                     <a:schemeClr val="tx1"/>
                   </a:solidFill>
                 </a:rPr>
-                <a:t>EL</a:t>
+                <a:t>EN</a:t>
               </a:r>
             </a:p>
           </p:txBody>
@@ -29561,7 +29508,7 @@
         </p:nvSpPr>
         <p:spPr>
           <a:xfrm>
-            <a:off x="13061171" y="14256419"/>
+            <a:off x="13173105" y="14256418"/>
             <a:ext cx="462963" cy="236492"/>
           </a:xfrm>
           <a:prstGeom prst="ellipse">
@@ -29596,7 +29543,62 @@
                   <a:schemeClr val="tx1"/>
                 </a:solidFill>
               </a:rPr>
-              <a:t>EQ</a:t>
+              <a:t>ER</a:t>
+            </a:r>
+          </a:p>
+        </p:txBody>
+      </p:sp>
+      <p:sp>
+        <p:nvSpPr>
+          <p:cNvPr id="740" name="Oval 739">
+            <a:extLst>
+              <a:ext uri="{FF2B5EF4-FFF2-40B4-BE49-F238E27FC236}">
+                <a16:creationId xmlns:a16="http://schemas.microsoft.com/office/drawing/2014/main" id="{2E6FA0A3-6A3A-4300-8A08-278168616AAB}"/>
+              </a:ext>
+            </a:extLst>
+          </p:cNvPr>
+          <p:cNvSpPr/>
+          <p:nvPr/>
+        </p:nvSpPr>
+        <p:spPr>
+          <a:xfrm>
+            <a:off x="3480115" y="6522289"/>
+            <a:ext cx="365760" cy="365760"/>
+          </a:xfrm>
+          <a:prstGeom prst="ellipse">
+            <a:avLst/>
+          </a:prstGeom>
+          <a:noFill/>
+          <a:ln w="34925" cmpd="dbl"/>
+        </p:spPr>
+        <p:style>
+          <a:lnRef idx="2">
+            <a:schemeClr val="dk1">
+              <a:shade val="50000"/>
+            </a:schemeClr>
+          </a:lnRef>
+          <a:fillRef idx="1">
+            <a:schemeClr val="dk1"/>
+          </a:fillRef>
+          <a:effectRef idx="0">
+            <a:schemeClr val="dk1"/>
+          </a:effectRef>
+          <a:fontRef idx="minor">
+            <a:schemeClr val="lt1"/>
+          </a:fontRef>
+        </p:style>
+        <p:txBody>
+          <a:bodyPr lIns="0" tIns="0" rIns="0" bIns="0" rtlCol="0" anchor="ctr"/>
+          <a:lstStyle/>
+          <a:p>
+            <a:pPr algn="ctr"/>
+            <a:r>
+              <a:rPr lang="en-US" sz="1600" dirty="0">
+                <a:solidFill>
+                  <a:schemeClr val="tx1"/>
+                </a:solidFill>
+              </a:rPr>
+              <a:t>E</a:t>
             </a:r>
           </a:p>
         </p:txBody>

</xml_diff>